<commit_message>
Criando a Primeira forma de executar o selenium
</commit_message>
<xml_diff>
--- a/selenium.pptx
+++ b/selenium.pptx
@@ -13,31 +13,34 @@
     <p:sldId id="257" r:id="rId6"/>
     <p:sldId id="271" r:id="rId7"/>
     <p:sldId id="264" r:id="rId8"/>
-    <p:sldId id="263" r:id="rId9"/>
+    <p:sldId id="272" r:id="rId9"/>
+    <p:sldId id="273" r:id="rId10"/>
+    <p:sldId id="274" r:id="rId11"/>
+    <p:sldId id="263" r:id="rId12"/>
   </p:sldIdLst>
   <p:sldSz cx="9144000" cy="5143500"/>
   <p:notesSz cx="6858000" cy="9144000"/>
   <p:embeddedFontLst>
     <p:embeddedFont>
       <p:font typeface="Poppins" charset="0"/>
-      <p:regular r:id="rId13"/>
-      <p:bold r:id="rId14"/>
-      <p:italic r:id="rId15"/>
-      <p:boldItalic r:id="rId16"/>
+      <p:regular r:id="rId16"/>
+      <p:bold r:id="rId17"/>
+      <p:italic r:id="rId18"/>
+      <p:boldItalic r:id="rId19"/>
     </p:embeddedFont>
     <p:embeddedFont>
       <p:font typeface="Poppins Medium" charset="0"/>
-      <p:regular r:id="rId17"/>
-      <p:bold r:id="rId18"/>
-      <p:italic r:id="rId19"/>
-      <p:boldItalic r:id="rId20"/>
+      <p:regular r:id="rId20"/>
+      <p:bold r:id="rId21"/>
+      <p:italic r:id="rId22"/>
+      <p:boldItalic r:id="rId23"/>
     </p:embeddedFont>
     <p:embeddedFont>
       <p:font typeface="Poppins SemiBold" charset="0"/>
-      <p:regular r:id="rId21"/>
-      <p:bold r:id="rId22"/>
-      <p:italic r:id="rId23"/>
-      <p:boldItalic r:id="rId24"/>
+      <p:regular r:id="rId24"/>
+      <p:bold r:id="rId25"/>
+      <p:italic r:id="rId26"/>
+      <p:boldItalic r:id="rId27"/>
     </p:embeddedFont>
   </p:embeddedFontLst>
   <p:defaultTextStyle>
@@ -1025,6 +1028,306 @@
 </file>
 
 <file path=ppt/notesSlides/notesSlide4.xml><?xml version="1.0" encoding="utf-8"?>
+<p:notes xmlns:a="http://schemas.openxmlformats.org/drawingml/2006/main" xmlns:r="http://schemas.openxmlformats.org/officeDocument/2006/relationships" xmlns:p="http://schemas.openxmlformats.org/presentationml/2006/main" showMasterPhAnim="0" showMasterSp="0">
+  <p:cSld>
+    <p:spTree>
+      <p:nvGrpSpPr>
+        <p:cNvPr id="74" name="Shape 74"/>
+        <p:cNvGrpSpPr/>
+        <p:nvPr/>
+      </p:nvGrpSpPr>
+      <p:grpSpPr>
+        <a:xfrm>
+          <a:off x="0" y="0"/>
+          <a:ext cx="0" cy="0"/>
+          <a:chOff x="0" y="0"/>
+          <a:chExt cx="0" cy="0"/>
+        </a:xfrm>
+      </p:grpSpPr>
+      <p:sp>
+        <p:nvSpPr>
+          <p:cNvPr id="75" name="Google Shape;75;gf6a69f5972_0_1:notes"/>
+          <p:cNvSpPr/>
+          <p:nvPr>
+            <p:ph type="sldImg" idx="2"/>
+          </p:nvPr>
+        </p:nvSpPr>
+        <p:spPr>
+          <a:xfrm>
+            <a:off x="381300" y="685800"/>
+            <a:ext cx="6096000" cy="3429000"/>
+          </a:xfrm>
+          <a:custGeom>
+            <a:avLst/>
+            <a:gdLst/>
+            <a:ahLst/>
+            <a:cxnLst/>
+            <a:rect l="l" t="t" r="r" b="b"/>
+            <a:pathLst>
+              <a:path w="120000" h="120000" extrusionOk="0">
+                <a:moveTo>
+                  <a:pt x="0" y="0"/>
+                </a:moveTo>
+                <a:lnTo>
+                  <a:pt x="120000" y="0"/>
+                </a:lnTo>
+                <a:lnTo>
+                  <a:pt x="120000" y="120000"/>
+                </a:lnTo>
+                <a:lnTo>
+                  <a:pt x="0" y="120000"/>
+                </a:lnTo>
+                <a:close/>
+              </a:path>
+            </a:pathLst>
+          </a:custGeom>
+        </p:spPr>
+      </p:sp>
+      <p:sp>
+        <p:nvSpPr>
+          <p:cNvPr id="76" name="Google Shape;76;gf6a69f5972_0_1:notes"/>
+          <p:cNvSpPr txBox="1"/>
+          <p:nvPr>
+            <p:ph type="body" idx="1"/>
+          </p:nvPr>
+        </p:nvSpPr>
+        <p:spPr>
+          <a:xfrm>
+            <a:off x="685800" y="4343400"/>
+            <a:ext cx="5486400" cy="4114800"/>
+          </a:xfrm>
+          <a:prstGeom prst="rect">
+            <a:avLst/>
+          </a:prstGeom>
+        </p:spPr>
+        <p:txBody>
+          <a:bodyPr spcFirstLastPara="1" wrap="square" lIns="91425" tIns="91425" rIns="91425" bIns="91425" anchor="t" anchorCtr="0">
+            <a:noAutofit/>
+          </a:bodyPr>
+          <a:lstStyle/>
+          <a:p>
+            <a:pPr marL="0" lvl="0" indent="0" algn="l" rtl="0">
+              <a:spcBef>
+                <a:spcPts val="0"/>
+              </a:spcBef>
+              <a:spcAft>
+                <a:spcPts val="0"/>
+              </a:spcAft>
+              <a:buNone/>
+            </a:pPr>
+            <a:endParaRPr lang="pt-BR"/>
+          </a:p>
+        </p:txBody>
+      </p:sp>
+    </p:spTree>
+  </p:cSld>
+  <p:clrMapOvr>
+    <a:masterClrMapping/>
+  </p:clrMapOvr>
+</p:notes>
+</file>
+
+<file path=ppt/notesSlides/notesSlide5.xml><?xml version="1.0" encoding="utf-8"?>
+<p:notes xmlns:a="http://schemas.openxmlformats.org/drawingml/2006/main" xmlns:r="http://schemas.openxmlformats.org/officeDocument/2006/relationships" xmlns:p="http://schemas.openxmlformats.org/presentationml/2006/main" showMasterPhAnim="0" showMasterSp="0">
+  <p:cSld>
+    <p:spTree>
+      <p:nvGrpSpPr>
+        <p:cNvPr id="74" name="Shape 74"/>
+        <p:cNvGrpSpPr/>
+        <p:nvPr/>
+      </p:nvGrpSpPr>
+      <p:grpSpPr>
+        <a:xfrm>
+          <a:off x="0" y="0"/>
+          <a:ext cx="0" cy="0"/>
+          <a:chOff x="0" y="0"/>
+          <a:chExt cx="0" cy="0"/>
+        </a:xfrm>
+      </p:grpSpPr>
+      <p:sp>
+        <p:nvSpPr>
+          <p:cNvPr id="75" name="Google Shape;75;gf6a69f5972_0_1:notes"/>
+          <p:cNvSpPr/>
+          <p:nvPr>
+            <p:ph type="sldImg" idx="2"/>
+          </p:nvPr>
+        </p:nvSpPr>
+        <p:spPr>
+          <a:xfrm>
+            <a:off x="381300" y="685800"/>
+            <a:ext cx="6096000" cy="3429000"/>
+          </a:xfrm>
+          <a:custGeom>
+            <a:avLst/>
+            <a:gdLst/>
+            <a:ahLst/>
+            <a:cxnLst/>
+            <a:rect l="l" t="t" r="r" b="b"/>
+            <a:pathLst>
+              <a:path w="120000" h="120000" extrusionOk="0">
+                <a:moveTo>
+                  <a:pt x="0" y="0"/>
+                </a:moveTo>
+                <a:lnTo>
+                  <a:pt x="120000" y="0"/>
+                </a:lnTo>
+                <a:lnTo>
+                  <a:pt x="120000" y="120000"/>
+                </a:lnTo>
+                <a:lnTo>
+                  <a:pt x="0" y="120000"/>
+                </a:lnTo>
+                <a:close/>
+              </a:path>
+            </a:pathLst>
+          </a:custGeom>
+        </p:spPr>
+      </p:sp>
+      <p:sp>
+        <p:nvSpPr>
+          <p:cNvPr id="76" name="Google Shape;76;gf6a69f5972_0_1:notes"/>
+          <p:cNvSpPr txBox="1"/>
+          <p:nvPr>
+            <p:ph type="body" idx="1"/>
+          </p:nvPr>
+        </p:nvSpPr>
+        <p:spPr>
+          <a:xfrm>
+            <a:off x="685800" y="4343400"/>
+            <a:ext cx="5486400" cy="4114800"/>
+          </a:xfrm>
+          <a:prstGeom prst="rect">
+            <a:avLst/>
+          </a:prstGeom>
+        </p:spPr>
+        <p:txBody>
+          <a:bodyPr spcFirstLastPara="1" wrap="square" lIns="91425" tIns="91425" rIns="91425" bIns="91425" anchor="t" anchorCtr="0">
+            <a:noAutofit/>
+          </a:bodyPr>
+          <a:lstStyle/>
+          <a:p>
+            <a:pPr marL="0" lvl="0" indent="0" algn="l" rtl="0">
+              <a:spcBef>
+                <a:spcPts val="0"/>
+              </a:spcBef>
+              <a:spcAft>
+                <a:spcPts val="0"/>
+              </a:spcAft>
+              <a:buNone/>
+            </a:pPr>
+            <a:endParaRPr lang="pt-BR"/>
+          </a:p>
+        </p:txBody>
+      </p:sp>
+    </p:spTree>
+  </p:cSld>
+  <p:clrMapOvr>
+    <a:masterClrMapping/>
+  </p:clrMapOvr>
+</p:notes>
+</file>
+
+<file path=ppt/notesSlides/notesSlide6.xml><?xml version="1.0" encoding="utf-8"?>
+<p:notes xmlns:a="http://schemas.openxmlformats.org/drawingml/2006/main" xmlns:r="http://schemas.openxmlformats.org/officeDocument/2006/relationships" xmlns:p="http://schemas.openxmlformats.org/presentationml/2006/main" showMasterPhAnim="0" showMasterSp="0">
+  <p:cSld>
+    <p:spTree>
+      <p:nvGrpSpPr>
+        <p:cNvPr id="74" name="Shape 74"/>
+        <p:cNvGrpSpPr/>
+        <p:nvPr/>
+      </p:nvGrpSpPr>
+      <p:grpSpPr>
+        <a:xfrm>
+          <a:off x="0" y="0"/>
+          <a:ext cx="0" cy="0"/>
+          <a:chOff x="0" y="0"/>
+          <a:chExt cx="0" cy="0"/>
+        </a:xfrm>
+      </p:grpSpPr>
+      <p:sp>
+        <p:nvSpPr>
+          <p:cNvPr id="75" name="Google Shape;75;gf6a69f5972_0_1:notes"/>
+          <p:cNvSpPr/>
+          <p:nvPr>
+            <p:ph type="sldImg" idx="2"/>
+          </p:nvPr>
+        </p:nvSpPr>
+        <p:spPr>
+          <a:xfrm>
+            <a:off x="381300" y="685800"/>
+            <a:ext cx="6096000" cy="3429000"/>
+          </a:xfrm>
+          <a:custGeom>
+            <a:avLst/>
+            <a:gdLst/>
+            <a:ahLst/>
+            <a:cxnLst/>
+            <a:rect l="l" t="t" r="r" b="b"/>
+            <a:pathLst>
+              <a:path w="120000" h="120000" extrusionOk="0">
+                <a:moveTo>
+                  <a:pt x="0" y="0"/>
+                </a:moveTo>
+                <a:lnTo>
+                  <a:pt x="120000" y="0"/>
+                </a:lnTo>
+                <a:lnTo>
+                  <a:pt x="120000" y="120000"/>
+                </a:lnTo>
+                <a:lnTo>
+                  <a:pt x="0" y="120000"/>
+                </a:lnTo>
+                <a:close/>
+              </a:path>
+            </a:pathLst>
+          </a:custGeom>
+        </p:spPr>
+      </p:sp>
+      <p:sp>
+        <p:nvSpPr>
+          <p:cNvPr id="76" name="Google Shape;76;gf6a69f5972_0_1:notes"/>
+          <p:cNvSpPr txBox="1"/>
+          <p:nvPr>
+            <p:ph type="body" idx="1"/>
+          </p:nvPr>
+        </p:nvSpPr>
+        <p:spPr>
+          <a:xfrm>
+            <a:off x="685800" y="4343400"/>
+            <a:ext cx="5486400" cy="4114800"/>
+          </a:xfrm>
+          <a:prstGeom prst="rect">
+            <a:avLst/>
+          </a:prstGeom>
+        </p:spPr>
+        <p:txBody>
+          <a:bodyPr spcFirstLastPara="1" wrap="square" lIns="91425" tIns="91425" rIns="91425" bIns="91425" anchor="t" anchorCtr="0">
+            <a:noAutofit/>
+          </a:bodyPr>
+          <a:lstStyle/>
+          <a:p>
+            <a:pPr marL="0" lvl="0" indent="0" algn="l" rtl="0">
+              <a:spcBef>
+                <a:spcPts val="0"/>
+              </a:spcBef>
+              <a:spcAft>
+                <a:spcPts val="0"/>
+              </a:spcAft>
+              <a:buNone/>
+            </a:pPr>
+            <a:endParaRPr lang="pt-BR"/>
+          </a:p>
+        </p:txBody>
+      </p:sp>
+    </p:spTree>
+  </p:cSld>
+  <p:clrMapOvr>
+    <a:masterClrMapping/>
+  </p:clrMapOvr>
+</p:notes>
+</file>
+
+<file path=ppt/notesSlides/notesSlide7.xml><?xml version="1.0" encoding="utf-8"?>
 <p:notes xmlns:a="http://schemas.openxmlformats.org/drawingml/2006/main" xmlns:r="http://schemas.openxmlformats.org/officeDocument/2006/relationships" xmlns:p="http://schemas.openxmlformats.org/presentationml/2006/main" showMasterPhAnim="0" showMasterSp="0">
   <p:cSld>
     <p:spTree>
@@ -4447,26 +4750,6 @@
       <p:grpSpPr/>
       <p:sp>
         <p:nvSpPr>
-          <p:cNvPr id="3" name="Título 2"/>
-          <p:cNvSpPr/>
-          <p:nvPr>
-            <p:ph type="title"/>
-          </p:nvPr>
-        </p:nvSpPr>
-        <p:spPr/>
-        <p:txBody>
-          <a:bodyPr/>
-          <a:p>
-            <a:r>
-              <a:rPr lang="pt-PT" altLang="pt-BR"/>
-              <a:t>O que é selenium?</a:t>
-            </a:r>
-            <a:endParaRPr lang="pt-PT" altLang="pt-BR"/>
-          </a:p>
-        </p:txBody>
-      </p:sp>
-      <p:sp>
-        <p:nvSpPr>
           <p:cNvPr id="4" name="Subtítulo 3"/>
           <p:cNvSpPr/>
           <p:nvPr>
@@ -4611,6 +4894,63 @@
           </a:prstGeom>
         </p:spPr>
       </p:pic>
+      <p:sp>
+        <p:nvSpPr>
+          <p:cNvPr id="78" name="Google Shape;78;p14"/>
+          <p:cNvSpPr txBox="1"/>
+          <p:nvPr/>
+        </p:nvSpPr>
+        <p:spPr>
+          <a:xfrm>
+            <a:off x="548800" y="667650"/>
+            <a:ext cx="5416200" cy="688975"/>
+          </a:xfrm>
+          <a:prstGeom prst="rect">
+            <a:avLst/>
+          </a:prstGeom>
+          <a:noFill/>
+          <a:ln>
+            <a:noFill/>
+          </a:ln>
+        </p:spPr>
+        <p:txBody>
+          <a:bodyPr spcFirstLastPara="1" wrap="square" lIns="91425" tIns="91425" rIns="91425" bIns="91425" anchor="t" anchorCtr="0">
+            <a:spAutoFit/>
+          </a:bodyPr>
+          <a:p>
+            <a:pPr marL="0" lvl="0" indent="0" algn="l" rtl="0">
+              <a:spcBef>
+                <a:spcPts val="0"/>
+              </a:spcBef>
+              <a:spcAft>
+                <a:spcPts val="0"/>
+              </a:spcAft>
+              <a:buNone/>
+            </a:pPr>
+            <a:r>
+              <a:rPr lang="pt-PT" altLang="pt-BR" sz="3300" b="1">
+                <a:highlight>
+                  <a:srgbClr val="00D563"/>
+                </a:highlight>
+                <a:latin typeface="Poppins"/>
+                <a:ea typeface="Poppins"/>
+                <a:cs typeface="Poppins"/>
+                <a:sym typeface="Poppins"/>
+              </a:rPr>
+              <a:t>O que é selenium?</a:t>
+            </a:r>
+            <a:endParaRPr lang="pt-PT" altLang="pt-BR" sz="3300" b="1">
+              <a:highlight>
+                <a:srgbClr val="00D563"/>
+              </a:highlight>
+              <a:latin typeface="Poppins"/>
+              <a:ea typeface="Poppins"/>
+              <a:cs typeface="Poppins"/>
+              <a:sym typeface="Poppins"/>
+            </a:endParaRPr>
+          </a:p>
+        </p:txBody>
+      </p:sp>
     </p:spTree>
   </p:cSld>
   <p:clrMapOvr>
@@ -4636,155 +4976,9 @@
           <a:chExt cx="0" cy="0"/>
         </a:xfrm>
       </p:grpSpPr>
-      <p:sp>
-        <p:nvSpPr>
-          <p:cNvPr id="78" name="Google Shape;78;p14"/>
-          <p:cNvSpPr txBox="1"/>
-          <p:nvPr/>
-        </p:nvSpPr>
-        <p:spPr>
-          <a:xfrm>
-            <a:off x="548800" y="667650"/>
-            <a:ext cx="5416200" cy="427355"/>
-          </a:xfrm>
-          <a:prstGeom prst="rect">
-            <a:avLst/>
-          </a:prstGeom>
-          <a:noFill/>
-          <a:ln>
-            <a:noFill/>
-          </a:ln>
-        </p:spPr>
-        <p:txBody>
-          <a:bodyPr spcFirstLastPara="1" wrap="square" lIns="91425" tIns="91425" rIns="91425" bIns="91425" anchor="t" anchorCtr="0">
-            <a:spAutoFit/>
-          </a:bodyPr>
-          <a:lstStyle/>
-          <a:p>
-            <a:pPr marL="0" lvl="0" indent="0" algn="l" rtl="0">
-              <a:spcBef>
-                <a:spcPts val="0"/>
-              </a:spcBef>
-              <a:spcAft>
-                <a:spcPts val="0"/>
-              </a:spcAft>
-              <a:buNone/>
-            </a:pPr>
-            <a:r>
-              <a:rPr lang="pt-PT" altLang="pt-BR" sz="1600" b="1">
-                <a:highlight>
-                  <a:srgbClr val="00D563"/>
-                </a:highlight>
-                <a:latin typeface="Poppins"/>
-                <a:ea typeface="Poppins"/>
-                <a:cs typeface="Poppins"/>
-                <a:sym typeface="Poppins"/>
-              </a:rPr>
-              <a:t>O que é selenium?</a:t>
-            </a:r>
-            <a:endParaRPr lang="pt-PT" altLang="pt-BR" sz="1600" b="1">
-              <a:highlight>
-                <a:srgbClr val="00D563"/>
-              </a:highlight>
-              <a:latin typeface="Poppins"/>
-              <a:ea typeface="Poppins"/>
-              <a:cs typeface="Poppins"/>
-              <a:sym typeface="Poppins"/>
-            </a:endParaRPr>
-          </a:p>
-        </p:txBody>
-      </p:sp>
-      <p:sp>
-        <p:nvSpPr>
-          <p:cNvPr id="79" name="Google Shape;79;p14"/>
-          <p:cNvSpPr txBox="1"/>
-          <p:nvPr/>
-        </p:nvSpPr>
-        <p:spPr>
-          <a:xfrm>
-            <a:off x="1281760" y="1899560"/>
-            <a:ext cx="5867700" cy="827405"/>
-          </a:xfrm>
-          <a:prstGeom prst="rect">
-            <a:avLst/>
-          </a:prstGeom>
-          <a:noFill/>
-          <a:ln>
-            <a:noFill/>
-          </a:ln>
-        </p:spPr>
-        <p:txBody>
-          <a:bodyPr spcFirstLastPara="1" wrap="square" lIns="91425" tIns="91425" rIns="91425" bIns="91425" anchor="t" anchorCtr="0">
-            <a:spAutoFit/>
-          </a:bodyPr>
-          <a:lstStyle/>
-          <a:p>
-            <a:pPr marL="425450" lvl="0" indent="-285750" algn="ctr" rtl="0">
-              <a:lnSpc>
-                <a:spcPct val="150000"/>
-              </a:lnSpc>
-              <a:spcBef>
-                <a:spcPts val="0"/>
-              </a:spcBef>
-              <a:spcAft>
-                <a:spcPts val="0"/>
-              </a:spcAft>
-              <a:buSzPts val="1400"/>
-              <a:buFont typeface="Arial" panose="02080604020202020204" pitchFamily="34" charset="0"/>
-              <a:buChar char="•"/>
-            </a:pPr>
-            <a:r>
-              <a:rPr lang="pt-PT" altLang="pt-BR">
-                <a:latin typeface="Poppins"/>
-                <a:ea typeface="Poppins"/>
-                <a:cs typeface="Poppins"/>
-                <a:sym typeface="Poppins"/>
-              </a:rPr>
-              <a:t>Ferramenta de testes automatizados</a:t>
-            </a:r>
-            <a:endParaRPr lang="pt-PT" altLang="pt-BR">
-              <a:latin typeface="Poppins"/>
-              <a:ea typeface="Poppins"/>
-              <a:cs typeface="Poppins"/>
-              <a:sym typeface="Poppins"/>
-            </a:endParaRPr>
-          </a:p>
-          <a:p>
-            <a:pPr marL="425450" lvl="0" indent="-285750" algn="ctr" rtl="0">
-              <a:lnSpc>
-                <a:spcPct val="150000"/>
-              </a:lnSpc>
-              <a:spcBef>
-                <a:spcPts val="0"/>
-              </a:spcBef>
-              <a:spcAft>
-                <a:spcPts val="0"/>
-              </a:spcAft>
-              <a:buSzPts val="1400"/>
-              <a:buFont typeface="Arial" panose="02080604020202020204" pitchFamily="34" charset="0"/>
-              <a:buChar char="•"/>
-            </a:pPr>
-            <a:r>
-              <a:rPr lang="pt-PT" altLang="pt-BR">
-                <a:latin typeface="Poppins"/>
-                <a:ea typeface="Poppins"/>
-                <a:cs typeface="Poppins"/>
-                <a:sym typeface="Poppins"/>
-              </a:rPr>
-              <a:t>Ferramenta de automação de navegação</a:t>
-            </a:r>
-            <a:endParaRPr lang="pt-PT" altLang="pt-BR">
-              <a:latin typeface="Poppins"/>
-              <a:ea typeface="Poppins"/>
-              <a:cs typeface="Poppins"/>
-              <a:sym typeface="Poppins"/>
-            </a:endParaRPr>
-          </a:p>
-        </p:txBody>
-      </p:sp>
       <p:pic>
         <p:nvPicPr>
-          <p:cNvPr id="3" name="Imagem 2"/>
+          <p:cNvPr id="5" name="Imagem 4"/>
           <p:cNvPicPr>
             <a:picLocks noChangeAspect="1"/>
           </p:cNvPicPr>
@@ -4798,17 +4992,194 @@
         </p:blipFill>
         <p:spPr>
           <a:xfrm>
-            <a:off x="6875145" y="2813050"/>
-            <a:ext cx="2095500" cy="2181225"/>
+            <a:off x="6205220" y="139065"/>
+            <a:ext cx="2675890" cy="3208655"/>
           </a:xfrm>
           <a:prstGeom prst="rect">
             <a:avLst/>
           </a:prstGeom>
         </p:spPr>
       </p:pic>
+      <p:sp>
+        <p:nvSpPr>
+          <p:cNvPr id="78" name="Google Shape;78;p14"/>
+          <p:cNvSpPr txBox="1"/>
+          <p:nvPr/>
+        </p:nvSpPr>
+        <p:spPr>
+          <a:xfrm>
+            <a:off x="548800" y="667650"/>
+            <a:ext cx="5416200" cy="688975"/>
+          </a:xfrm>
+          <a:prstGeom prst="rect">
+            <a:avLst/>
+          </a:prstGeom>
+          <a:noFill/>
+          <a:ln>
+            <a:noFill/>
+          </a:ln>
+        </p:spPr>
+        <p:txBody>
+          <a:bodyPr spcFirstLastPara="1" wrap="square" lIns="91425" tIns="91425" rIns="91425" bIns="91425" anchor="t" anchorCtr="0">
+            <a:spAutoFit/>
+          </a:bodyPr>
+          <a:lstStyle/>
+          <a:p>
+            <a:pPr marL="0" lvl="0" indent="0" algn="l" rtl="0">
+              <a:spcBef>
+                <a:spcPts val="0"/>
+              </a:spcBef>
+              <a:spcAft>
+                <a:spcPts val="0"/>
+              </a:spcAft>
+              <a:buNone/>
+            </a:pPr>
+            <a:r>
+              <a:rPr lang="pt-PT" altLang="pt-BR" sz="3300" b="1">
+                <a:highlight>
+                  <a:srgbClr val="00D563"/>
+                </a:highlight>
+                <a:latin typeface="Poppins"/>
+                <a:ea typeface="Poppins"/>
+                <a:cs typeface="Poppins"/>
+                <a:sym typeface="Poppins"/>
+              </a:rPr>
+              <a:t>O que é selenium?</a:t>
+            </a:r>
+            <a:endParaRPr lang="pt-PT" altLang="pt-BR" sz="3300" b="1">
+              <a:highlight>
+                <a:srgbClr val="00D563"/>
+              </a:highlight>
+              <a:latin typeface="Poppins"/>
+              <a:ea typeface="Poppins"/>
+              <a:cs typeface="Poppins"/>
+              <a:sym typeface="Poppins"/>
+            </a:endParaRPr>
+          </a:p>
+        </p:txBody>
+      </p:sp>
+      <p:sp>
+        <p:nvSpPr>
+          <p:cNvPr id="79" name="Google Shape;79;p14"/>
+          <p:cNvSpPr txBox="1"/>
+          <p:nvPr/>
+        </p:nvSpPr>
+        <p:spPr>
+          <a:xfrm>
+            <a:off x="1281760" y="1899560"/>
+            <a:ext cx="5867700" cy="2397125"/>
+          </a:xfrm>
+          <a:prstGeom prst="rect">
+            <a:avLst/>
+          </a:prstGeom>
+          <a:noFill/>
+          <a:ln>
+            <a:noFill/>
+          </a:ln>
+        </p:spPr>
+        <p:txBody>
+          <a:bodyPr spcFirstLastPara="1" wrap="square" lIns="91425" tIns="91425" rIns="91425" bIns="91425" anchor="t" anchorCtr="0">
+            <a:spAutoFit/>
+          </a:bodyPr>
+          <a:lstStyle/>
+          <a:p>
+            <a:pPr marL="425450" lvl="0" indent="-285750" algn="ctr" rtl="0">
+              <a:lnSpc>
+                <a:spcPct val="150000"/>
+              </a:lnSpc>
+              <a:spcBef>
+                <a:spcPts val="0"/>
+              </a:spcBef>
+              <a:spcAft>
+                <a:spcPts val="0"/>
+              </a:spcAft>
+              <a:buSzPts val="1400"/>
+              <a:buFont typeface="Arial" panose="02080604020202020204" pitchFamily="34" charset="0"/>
+              <a:buChar char="•"/>
+            </a:pPr>
+            <a:r>
+              <a:rPr lang="pt-PT" altLang="pt-BR" sz="2400">
+                <a:latin typeface="Poppins"/>
+                <a:ea typeface="Poppins"/>
+                <a:cs typeface="Poppins"/>
+                <a:sym typeface="Poppins"/>
+              </a:rPr>
+              <a:t>Simula uma pessoa navegando.</a:t>
+            </a:r>
+            <a:endParaRPr lang="pt-PT" altLang="pt-BR" sz="2400">
+              <a:latin typeface="Poppins"/>
+              <a:ea typeface="Poppins"/>
+              <a:cs typeface="Poppins"/>
+              <a:sym typeface="Poppins"/>
+            </a:endParaRPr>
+          </a:p>
+          <a:p>
+            <a:pPr marL="425450" lvl="0" indent="-285750" algn="ctr" rtl="0">
+              <a:lnSpc>
+                <a:spcPct val="150000"/>
+              </a:lnSpc>
+              <a:spcBef>
+                <a:spcPts val="0"/>
+              </a:spcBef>
+              <a:spcAft>
+                <a:spcPts val="0"/>
+              </a:spcAft>
+              <a:buSzPts val="1400"/>
+              <a:buFont typeface="Arial" panose="02080604020202020204" pitchFamily="34" charset="0"/>
+              <a:buChar char="•"/>
+            </a:pPr>
+            <a:r>
+              <a:rPr lang="pt-PT" altLang="pt-BR" sz="2400">
+                <a:latin typeface="Poppins"/>
+                <a:ea typeface="Poppins"/>
+                <a:cs typeface="Poppins"/>
+                <a:sym typeface="Poppins"/>
+              </a:rPr>
+              <a:t>Ferramenta de testes automatizados.</a:t>
+            </a:r>
+            <a:endParaRPr lang="pt-PT" altLang="pt-BR" sz="2400">
+              <a:latin typeface="Poppins"/>
+              <a:ea typeface="Poppins"/>
+              <a:cs typeface="Poppins"/>
+              <a:sym typeface="Poppins"/>
+            </a:endParaRPr>
+          </a:p>
+          <a:p>
+            <a:pPr marL="425450" lvl="0" indent="-285750" algn="ctr" rtl="0">
+              <a:lnSpc>
+                <a:spcPct val="150000"/>
+              </a:lnSpc>
+              <a:spcBef>
+                <a:spcPts val="0"/>
+              </a:spcBef>
+              <a:spcAft>
+                <a:spcPts val="0"/>
+              </a:spcAft>
+              <a:buSzPts val="1400"/>
+              <a:buFont typeface="Arial" panose="02080604020202020204" pitchFamily="34" charset="0"/>
+              <a:buChar char="•"/>
+            </a:pPr>
+            <a:r>
+              <a:rPr lang="pt-PT" altLang="pt-BR" sz="2400">
+                <a:latin typeface="Poppins"/>
+                <a:ea typeface="Poppins"/>
+                <a:cs typeface="Poppins"/>
+                <a:sym typeface="Poppins"/>
+              </a:rPr>
+              <a:t>Ferramenta de automação de navegação.</a:t>
+            </a:r>
+            <a:endParaRPr lang="pt-PT" altLang="pt-BR" sz="2400">
+              <a:latin typeface="Poppins"/>
+              <a:ea typeface="Poppins"/>
+              <a:cs typeface="Poppins"/>
+              <a:sym typeface="Poppins"/>
+            </a:endParaRPr>
+          </a:p>
+        </p:txBody>
+      </p:sp>
       <p:pic>
         <p:nvPicPr>
-          <p:cNvPr id="5" name="Imagem 4"/>
+          <p:cNvPr id="3" name="Imagem 2"/>
           <p:cNvPicPr>
             <a:picLocks noChangeAspect="1"/>
           </p:cNvPicPr>
@@ -4822,8 +5193,8 @@
         </p:blipFill>
         <p:spPr>
           <a:xfrm>
-            <a:off x="6630670" y="377825"/>
-            <a:ext cx="2675890" cy="3208655"/>
+            <a:off x="7053580" y="2998470"/>
+            <a:ext cx="1917065" cy="1995805"/>
           </a:xfrm>
           <a:prstGeom prst="rect">
             <a:avLst/>
@@ -4860,33 +5231,18 @@
       <p:grpSpPr/>
       <p:sp>
         <p:nvSpPr>
-          <p:cNvPr id="3" name="Título 2"/>
-          <p:cNvSpPr/>
-          <p:nvPr>
-            <p:ph type="title"/>
-          </p:nvPr>
-        </p:nvSpPr>
-        <p:spPr/>
-        <p:txBody>
-          <a:bodyPr/>
-          <a:p>
-            <a:r>
-              <a:rPr lang="pt-PT" altLang="pt-BR"/>
-              <a:t>Desafio para um bom teste</a:t>
-            </a:r>
-            <a:endParaRPr lang="pt-PT" altLang="pt-BR"/>
-          </a:p>
-        </p:txBody>
-      </p:sp>
-      <p:sp>
-        <p:nvSpPr>
           <p:cNvPr id="4" name="Subtítulo 3"/>
           <p:cNvSpPr/>
           <p:nvPr>
             <p:ph type="subTitle" idx="2"/>
           </p:nvPr>
         </p:nvSpPr>
-        <p:spPr/>
+        <p:spPr>
+          <a:xfrm>
+            <a:off x="263525" y="1504315"/>
+            <a:ext cx="8229600" cy="3394472"/>
+          </a:xfrm>
+        </p:spPr>
         <p:txBody>
           <a:bodyPr/>
           <a:p>
@@ -4937,7 +5293,7 @@
             </a:pPr>
             <a:r>
               <a:rPr lang="pt-PT" altLang="pt-BR"/>
-              <a:t>Densenvolvido junto com a tela/pagina com todos detalhes.</a:t>
+              <a:t>Devem ser densenvolvido junto com a tela/pagina com todos detalhes.</a:t>
             </a:r>
             <a:endParaRPr lang="pt-PT" altLang="pt-BR"/>
           </a:p>
@@ -4962,7 +5318,7 @@
       </p:sp>
       <p:pic>
         <p:nvPicPr>
-          <p:cNvPr id="5" name="Imagem 4"/>
+          <p:cNvPr id="2" name="Imagem 1" descr="adr_1-1"/>
           <p:cNvPicPr>
             <a:picLocks noChangeAspect="1"/>
           </p:cNvPicPr>
@@ -4976,14 +5332,71 @@
         </p:blipFill>
         <p:spPr>
           <a:xfrm>
-            <a:off x="82550" y="2882265"/>
-            <a:ext cx="2095500" cy="2181225"/>
+            <a:off x="5669280" y="3133725"/>
+            <a:ext cx="3528695" cy="1824990"/>
           </a:xfrm>
           <a:prstGeom prst="rect">
             <a:avLst/>
           </a:prstGeom>
         </p:spPr>
       </p:pic>
+      <p:sp>
+        <p:nvSpPr>
+          <p:cNvPr id="78" name="Google Shape;78;p14"/>
+          <p:cNvSpPr txBox="1"/>
+          <p:nvPr/>
+        </p:nvSpPr>
+        <p:spPr>
+          <a:xfrm>
+            <a:off x="548640" y="667385"/>
+            <a:ext cx="7198360" cy="688975"/>
+          </a:xfrm>
+          <a:prstGeom prst="rect">
+            <a:avLst/>
+          </a:prstGeom>
+          <a:noFill/>
+          <a:ln>
+            <a:noFill/>
+          </a:ln>
+        </p:spPr>
+        <p:txBody>
+          <a:bodyPr spcFirstLastPara="1" wrap="square" lIns="91425" tIns="91425" rIns="91425" bIns="91425" anchor="t" anchorCtr="0">
+            <a:spAutoFit/>
+          </a:bodyPr>
+          <a:p>
+            <a:pPr marL="0" lvl="0" indent="0" algn="l" rtl="0">
+              <a:spcBef>
+                <a:spcPts val="0"/>
+              </a:spcBef>
+              <a:spcAft>
+                <a:spcPts val="0"/>
+              </a:spcAft>
+              <a:buNone/>
+            </a:pPr>
+            <a:r>
+              <a:rPr lang="pt-PT" altLang="pt-BR" sz="3300" b="1">
+                <a:highlight>
+                  <a:srgbClr val="00D563"/>
+                </a:highlight>
+                <a:latin typeface="Poppins"/>
+                <a:ea typeface="Poppins"/>
+                <a:cs typeface="Poppins"/>
+                <a:sym typeface="Poppins"/>
+              </a:rPr>
+              <a:t>O que deve ser testado?</a:t>
+            </a:r>
+            <a:endParaRPr lang="pt-PT" altLang="pt-BR" sz="3300" b="1">
+              <a:highlight>
+                <a:srgbClr val="00D563"/>
+              </a:highlight>
+              <a:latin typeface="Poppins"/>
+              <a:ea typeface="Poppins"/>
+              <a:cs typeface="Poppins"/>
+              <a:sym typeface="Poppins"/>
+            </a:endParaRPr>
+          </a:p>
+        </p:txBody>
+      </p:sp>
     </p:spTree>
   </p:cSld>
   <p:clrMapOvr>
@@ -5017,8 +5430,8 @@
         </p:nvSpPr>
         <p:spPr>
           <a:xfrm>
-            <a:off x="548800" y="667650"/>
-            <a:ext cx="5416200" cy="427355"/>
+            <a:off x="556420" y="667650"/>
+            <a:ext cx="5416200" cy="688975"/>
           </a:xfrm>
           <a:prstGeom prst="rect">
             <a:avLst/>
@@ -5044,7 +5457,7 @@
               <a:buNone/>
             </a:pPr>
             <a:r>
-              <a:rPr lang="pt-PT" altLang="pt-BR" sz="1600" b="1">
+              <a:rPr lang="pt-PT" altLang="pt-BR" sz="3300" b="1">
                 <a:highlight>
                   <a:srgbClr val="00D563"/>
                 </a:highlight>
@@ -5055,7 +5468,7 @@
               </a:rPr>
               <a:t>Para que testar?</a:t>
             </a:r>
-            <a:endParaRPr lang="pt-PT" altLang="pt-BR" sz="1600" b="1">
+            <a:endParaRPr lang="pt-PT" altLang="pt-BR" sz="3300" b="1">
               <a:highlight>
                 <a:srgbClr val="00D563"/>
               </a:highlight>
@@ -5076,7 +5489,7 @@
         <p:spPr>
           <a:xfrm>
             <a:off x="1637995" y="1899560"/>
-            <a:ext cx="5867700" cy="1150620"/>
+            <a:ext cx="5867700" cy="2397125"/>
           </a:xfrm>
           <a:prstGeom prst="rect">
             <a:avLst/>
@@ -5107,15 +5520,15 @@
               <a:buChar char="●"/>
             </a:pPr>
             <a:r>
-              <a:rPr lang="pt-PT" altLang="pt-BR">
+              <a:rPr lang="pt-PT" altLang="pt-BR" sz="2400">
                 <a:latin typeface="Poppins"/>
                 <a:ea typeface="Poppins"/>
                 <a:cs typeface="Poppins"/>
                 <a:sym typeface="Poppins"/>
               </a:rPr>
-              <a:t>Testes trazem garantias do que foi desenvolvido!</a:t>
-            </a:r>
-            <a:endParaRPr lang="pt-PT" altLang="pt-BR">
+              <a:t>Testes trazem garantias do que foi desenvolvido.</a:t>
+            </a:r>
+            <a:endParaRPr lang="pt-PT" altLang="pt-BR" sz="2400">
               <a:latin typeface="Poppins"/>
               <a:ea typeface="Poppins"/>
               <a:cs typeface="Poppins"/>
@@ -5138,37 +5551,15 @@
               <a:buChar char="●"/>
             </a:pPr>
             <a:r>
-              <a:rPr lang="pt-PT" altLang="pt-BR">
+              <a:rPr lang="pt-PT" altLang="pt-BR" sz="2400">
                 <a:latin typeface="Poppins"/>
                 <a:ea typeface="Poppins"/>
                 <a:cs typeface="Poppins"/>
                 <a:sym typeface="Poppins"/>
               </a:rPr>
-              <a:t>Testes orientam no desenvolvimento!</a:t>
-            </a:r>
-            <a:endParaRPr lang="pt-PT" altLang="pt-BR">
-              <a:latin typeface="Poppins"/>
-              <a:ea typeface="Poppins"/>
-              <a:cs typeface="Poppins"/>
-              <a:sym typeface="Poppins"/>
-            </a:endParaRPr>
-          </a:p>
-          <a:p>
-            <a:pPr marL="139700" lvl="0" indent="0" algn="ctr" rtl="0">
-              <a:lnSpc>
-                <a:spcPct val="150000"/>
-              </a:lnSpc>
-              <a:spcBef>
-                <a:spcPts val="0"/>
-              </a:spcBef>
-              <a:spcAft>
-                <a:spcPts val="0"/>
-              </a:spcAft>
-              <a:buSzPts val="1400"/>
-              <a:buFont typeface="Poppins"/>
-              <a:buNone/>
-            </a:pPr>
-            <a:endParaRPr lang="pt-PT" altLang="pt-BR">
+              <a:t>Testes podem ajudar a refinar o desenvolvimento.</a:t>
+            </a:r>
+            <a:endParaRPr lang="pt-PT" altLang="pt-BR" sz="2400">
               <a:latin typeface="Poppins"/>
               <a:ea typeface="Poppins"/>
               <a:cs typeface="Poppins"/>
@@ -5193,7 +5584,7 @@
         </p:blipFill>
         <p:spPr>
           <a:xfrm>
-            <a:off x="6231890" y="2319655"/>
+            <a:off x="6597015" y="2797810"/>
             <a:ext cx="2695575" cy="2345690"/>
           </a:xfrm>
           <a:prstGeom prst="rect">
@@ -5214,6 +5605,485 @@
   <p:cSld>
     <p:spTree>
       <p:nvGrpSpPr>
+        <p:cNvPr id="77" name="Shape 77"/>
+        <p:cNvGrpSpPr/>
+        <p:nvPr/>
+      </p:nvGrpSpPr>
+      <p:grpSpPr>
+        <a:xfrm>
+          <a:off x="0" y="0"/>
+          <a:ext cx="0" cy="0"/>
+          <a:chOff x="0" y="0"/>
+          <a:chExt cx="0" cy="0"/>
+        </a:xfrm>
+      </p:grpSpPr>
+      <p:sp>
+        <p:nvSpPr>
+          <p:cNvPr id="78" name="Google Shape;78;p14"/>
+          <p:cNvSpPr txBox="1"/>
+          <p:nvPr/>
+        </p:nvSpPr>
+        <p:spPr>
+          <a:xfrm>
+            <a:off x="556260" y="667385"/>
+            <a:ext cx="8082915" cy="688975"/>
+          </a:xfrm>
+          <a:prstGeom prst="rect">
+            <a:avLst/>
+          </a:prstGeom>
+          <a:noFill/>
+          <a:ln>
+            <a:noFill/>
+          </a:ln>
+        </p:spPr>
+        <p:txBody>
+          <a:bodyPr spcFirstLastPara="1" wrap="square" lIns="91425" tIns="91425" rIns="91425" bIns="91425" anchor="t" anchorCtr="0">
+            <a:spAutoFit/>
+          </a:bodyPr>
+          <a:lstStyle/>
+          <a:p>
+            <a:pPr marL="0" lvl="0" indent="0" algn="l" rtl="0">
+              <a:spcBef>
+                <a:spcPts val="0"/>
+              </a:spcBef>
+              <a:spcAft>
+                <a:spcPts val="0"/>
+              </a:spcAft>
+              <a:buNone/>
+            </a:pPr>
+            <a:r>
+              <a:rPr lang="pt-PT" altLang="pt-BR" sz="3300" b="1">
+                <a:highlight>
+                  <a:srgbClr val="00D563"/>
+                </a:highlight>
+                <a:latin typeface="Poppins"/>
+                <a:ea typeface="Poppins"/>
+                <a:cs typeface="Poppins"/>
+                <a:sym typeface="Poppins"/>
+              </a:rPr>
+              <a:t>Refinar no desenvolvimento</a:t>
+            </a:r>
+            <a:endParaRPr lang="pt-PT" altLang="pt-BR" sz="3300" b="1">
+              <a:highlight>
+                <a:srgbClr val="00D563"/>
+              </a:highlight>
+              <a:latin typeface="Poppins"/>
+              <a:ea typeface="Poppins"/>
+              <a:cs typeface="Poppins"/>
+              <a:sym typeface="Poppins"/>
+            </a:endParaRPr>
+          </a:p>
+        </p:txBody>
+      </p:sp>
+      <p:pic>
+        <p:nvPicPr>
+          <p:cNvPr id="3" name="Imagem 2"/>
+          <p:cNvPicPr>
+            <a:picLocks noChangeAspect="1"/>
+          </p:cNvPicPr>
+          <p:nvPr/>
+        </p:nvPicPr>
+        <p:blipFill>
+          <a:blip r:embed="rId1"/>
+          <a:stretch>
+            <a:fillRect/>
+          </a:stretch>
+        </p:blipFill>
+        <p:spPr>
+          <a:xfrm>
+            <a:off x="-4445" y="2082800"/>
+            <a:ext cx="9203690" cy="1892300"/>
+          </a:xfrm>
+          <a:prstGeom prst="rect">
+            <a:avLst/>
+          </a:prstGeom>
+        </p:spPr>
+      </p:pic>
+    </p:spTree>
+  </p:cSld>
+  <p:clrMapOvr>
+    <a:masterClrMapping/>
+  </p:clrMapOvr>
+</p:sld>
+</file>
+
+<file path=ppt/slides/slide7.xml><?xml version="1.0" encoding="utf-8"?>
+<p:sld xmlns:a="http://schemas.openxmlformats.org/drawingml/2006/main" xmlns:r="http://schemas.openxmlformats.org/officeDocument/2006/relationships" xmlns:p="http://schemas.openxmlformats.org/presentationml/2006/main">
+  <p:cSld>
+    <p:spTree>
+      <p:nvGrpSpPr>
+        <p:cNvPr id="77" name="Shape 77"/>
+        <p:cNvGrpSpPr/>
+        <p:nvPr/>
+      </p:nvGrpSpPr>
+      <p:grpSpPr>
+        <a:xfrm>
+          <a:off x="0" y="0"/>
+          <a:ext cx="0" cy="0"/>
+          <a:chOff x="0" y="0"/>
+          <a:chExt cx="0" cy="0"/>
+        </a:xfrm>
+      </p:grpSpPr>
+      <p:sp>
+        <p:nvSpPr>
+          <p:cNvPr id="9" name="Espaço Reservado para Texto 8"/>
+          <p:cNvSpPr>
+            <a:spLocks noGrp="1"/>
+          </p:cNvSpPr>
+          <p:nvPr>
+            <p:ph type="body" idx="1"/>
+          </p:nvPr>
+        </p:nvSpPr>
+        <p:spPr>
+          <a:xfrm>
+            <a:off x="624205" y="2234565"/>
+            <a:ext cx="7886700" cy="2332990"/>
+          </a:xfrm>
+        </p:spPr>
+        <p:txBody>
+          <a:bodyPr/>
+          <a:p>
+            <a:r>
+              <a:rPr lang="pt-PT" altLang="pt-BR"/>
+              <a:t># criação de ambiente virtual</a:t>
+            </a:r>
+            <a:endParaRPr lang="pt-PT" altLang="pt-BR"/>
+          </a:p>
+          <a:p>
+            <a:r>
+              <a:rPr lang="pt-PT" altLang="pt-BR">
+                <a:ln/>
+                <a:solidFill>
+                  <a:schemeClr val="tx1"/>
+                </a:solidFill>
+                <a:effectLst>
+                  <a:outerShdw blurRad="38100" dist="19050" dir="2700000" algn="tl" rotWithShape="0">
+                    <a:schemeClr val="dk1">
+                      <a:alpha val="40000"/>
+                    </a:schemeClr>
+                  </a:outerShdw>
+                </a:effectLst>
+              </a:rPr>
+              <a:t>python -m venv ambiente_test</a:t>
+            </a:r>
+            <a:endParaRPr lang="pt-PT" altLang="pt-BR">
+              <a:ln/>
+              <a:solidFill>
+                <a:schemeClr val="tx1"/>
+              </a:solidFill>
+              <a:effectLst>
+                <a:outerShdw blurRad="38100" dist="19050" dir="2700000" algn="tl" rotWithShape="0">
+                  <a:schemeClr val="dk1">
+                    <a:alpha val="40000"/>
+                  </a:schemeClr>
+                </a:outerShdw>
+              </a:effectLst>
+            </a:endParaRPr>
+          </a:p>
+          <a:p>
+            <a:r>
+              <a:rPr lang="pt-PT" altLang="pt-BR">
+                <a:sym typeface="+mn-ea"/>
+              </a:rPr>
+              <a:t># ativando ambiente</a:t>
+            </a:r>
+            <a:endParaRPr lang="pt-PT" altLang="pt-BR"/>
+          </a:p>
+          <a:p>
+            <a:r>
+              <a:rPr lang="pt-PT" altLang="pt-BR">
+                <a:ln/>
+                <a:solidFill>
+                  <a:schemeClr val="tx1"/>
+                </a:solidFill>
+                <a:effectLst>
+                  <a:outerShdw blurRad="38100" dist="19050" dir="2700000" algn="tl" rotWithShape="0">
+                    <a:schemeClr val="dk1">
+                      <a:alpha val="40000"/>
+                    </a:schemeClr>
+                  </a:outerShdw>
+                </a:effectLst>
+              </a:rPr>
+              <a:t>source venv/bin/activate</a:t>
+            </a:r>
+            <a:endParaRPr lang="pt-PT" altLang="pt-BR">
+              <a:ln/>
+              <a:solidFill>
+                <a:schemeClr val="tx1"/>
+              </a:solidFill>
+              <a:effectLst>
+                <a:outerShdw blurRad="38100" dist="19050" dir="2700000" algn="tl" rotWithShape="0">
+                  <a:schemeClr val="dk1">
+                    <a:alpha val="40000"/>
+                  </a:schemeClr>
+                </a:outerShdw>
+              </a:effectLst>
+            </a:endParaRPr>
+          </a:p>
+          <a:p>
+            <a:r>
+              <a:rPr lang="pt-PT" altLang="pt-BR">
+                <a:sym typeface="+mn-ea"/>
+              </a:rPr>
+              <a:t># instalando selenium</a:t>
+            </a:r>
+            <a:endParaRPr lang="pt-PT" altLang="pt-BR"/>
+          </a:p>
+          <a:p>
+            <a:r>
+              <a:rPr lang="pt-PT" altLang="pt-BR">
+                <a:ln/>
+                <a:solidFill>
+                  <a:schemeClr val="tx1"/>
+                </a:solidFill>
+                <a:effectLst>
+                  <a:outerShdw blurRad="38100" dist="19050" dir="2700000" algn="tl" rotWithShape="0">
+                    <a:schemeClr val="dk1">
+                      <a:alpha val="40000"/>
+                    </a:schemeClr>
+                  </a:outerShdw>
+                </a:effectLst>
+              </a:rPr>
+              <a:t>pip install selenium webdriver_manager</a:t>
+            </a:r>
+            <a:endParaRPr lang="pt-PT" altLang="pt-BR">
+              <a:ln/>
+              <a:solidFill>
+                <a:schemeClr val="tx1"/>
+              </a:solidFill>
+              <a:effectLst>
+                <a:outerShdw blurRad="38100" dist="19050" dir="2700000" algn="tl" rotWithShape="0">
+                  <a:schemeClr val="dk1">
+                    <a:alpha val="40000"/>
+                  </a:schemeClr>
+                </a:outerShdw>
+              </a:effectLst>
+            </a:endParaRPr>
+          </a:p>
+        </p:txBody>
+      </p:sp>
+      <p:sp>
+        <p:nvSpPr>
+          <p:cNvPr id="78" name="Google Shape;78;p14"/>
+          <p:cNvSpPr txBox="1"/>
+          <p:nvPr/>
+        </p:nvSpPr>
+        <p:spPr>
+          <a:xfrm>
+            <a:off x="556260" y="667385"/>
+            <a:ext cx="8082915" cy="688975"/>
+          </a:xfrm>
+          <a:prstGeom prst="rect">
+            <a:avLst/>
+          </a:prstGeom>
+          <a:noFill/>
+          <a:ln>
+            <a:noFill/>
+          </a:ln>
+        </p:spPr>
+        <p:txBody>
+          <a:bodyPr spcFirstLastPara="1" wrap="square" lIns="91425" tIns="91425" rIns="91425" bIns="91425" anchor="t" anchorCtr="0">
+            <a:spAutoFit/>
+          </a:bodyPr>
+          <a:lstStyle/>
+          <a:p>
+            <a:pPr marL="0" lvl="0" indent="0" algn="l" rtl="0">
+              <a:spcBef>
+                <a:spcPts val="0"/>
+              </a:spcBef>
+              <a:spcAft>
+                <a:spcPts val="0"/>
+              </a:spcAft>
+              <a:buNone/>
+            </a:pPr>
+            <a:r>
+              <a:rPr lang="pt-PT" altLang="pt-BR" sz="3300" b="1">
+                <a:highlight>
+                  <a:srgbClr val="00D563"/>
+                </a:highlight>
+                <a:latin typeface="Poppins"/>
+                <a:ea typeface="Poppins"/>
+                <a:cs typeface="Poppins"/>
+                <a:sym typeface="Poppins"/>
+              </a:rPr>
+              <a:t>Por onde começar?!</a:t>
+            </a:r>
+            <a:endParaRPr lang="pt-PT" altLang="pt-BR" sz="3300" b="1">
+              <a:highlight>
+                <a:srgbClr val="00D563"/>
+              </a:highlight>
+              <a:latin typeface="Poppins"/>
+              <a:ea typeface="Poppins"/>
+              <a:cs typeface="Poppins"/>
+              <a:sym typeface="Poppins"/>
+            </a:endParaRPr>
+          </a:p>
+        </p:txBody>
+      </p:sp>
+    </p:spTree>
+  </p:cSld>
+  <p:clrMapOvr>
+    <a:masterClrMapping/>
+  </p:clrMapOvr>
+</p:sld>
+</file>
+
+<file path=ppt/slides/slide8.xml><?xml version="1.0" encoding="utf-8"?>
+<p:sld xmlns:a="http://schemas.openxmlformats.org/drawingml/2006/main" xmlns:r="http://schemas.openxmlformats.org/officeDocument/2006/relationships" xmlns:p="http://schemas.openxmlformats.org/presentationml/2006/main">
+  <p:cSld>
+    <p:spTree>
+      <p:nvGrpSpPr>
+        <p:cNvPr id="77" name="Shape 77"/>
+        <p:cNvGrpSpPr/>
+        <p:nvPr/>
+      </p:nvGrpSpPr>
+      <p:grpSpPr>
+        <a:xfrm>
+          <a:off x="0" y="0"/>
+          <a:ext cx="0" cy="0"/>
+          <a:chOff x="0" y="0"/>
+          <a:chExt cx="0" cy="0"/>
+        </a:xfrm>
+      </p:grpSpPr>
+      <p:sp>
+        <p:nvSpPr>
+          <p:cNvPr id="9" name="Espaço Reservado para Texto 8"/>
+          <p:cNvSpPr>
+            <a:spLocks noGrp="1"/>
+          </p:cNvSpPr>
+          <p:nvPr>
+            <p:ph type="body" idx="1"/>
+          </p:nvPr>
+        </p:nvSpPr>
+        <p:spPr>
+          <a:xfrm>
+            <a:off x="624205" y="2234565"/>
+            <a:ext cx="7886700" cy="2332990"/>
+          </a:xfrm>
+        </p:spPr>
+        <p:txBody>
+          <a:bodyPr/>
+          <a:p>
+            <a:pPr algn="ctr"/>
+            <a:r>
+              <a:rPr lang="pt-PT" altLang="pt-BR">
+                <a:ln/>
+                <a:solidFill>
+                  <a:schemeClr val="tx1"/>
+                </a:solidFill>
+                <a:effectLst>
+                  <a:outerShdw blurRad="38100" dist="19050" dir="2700000" algn="tl" rotWithShape="0">
+                    <a:schemeClr val="dk1">
+                      <a:alpha val="40000"/>
+                    </a:schemeClr>
+                  </a:outerShdw>
+                </a:effectLst>
+              </a:rPr>
+              <a:t>Vou usar o </a:t>
+            </a:r>
+            <a:r>
+              <a:rPr lang="pt-PT" altLang="pt-BR" b="1">
+                <a:ln/>
+                <a:solidFill>
+                  <a:schemeClr val="tx1"/>
+                </a:solidFill>
+                <a:effectLst>
+                  <a:outerShdw blurRad="38100" dist="19050" dir="2700000" algn="tl" rotWithShape="0">
+                    <a:schemeClr val="dk1">
+                      <a:alpha val="40000"/>
+                    </a:schemeClr>
+                  </a:outerShdw>
+                </a:effectLst>
+              </a:rPr>
+              <a:t>codium</a:t>
+            </a:r>
+            <a:endParaRPr lang="pt-PT" altLang="pt-BR" b="1">
+              <a:ln/>
+              <a:solidFill>
+                <a:schemeClr val="tx1"/>
+              </a:solidFill>
+              <a:effectLst>
+                <a:outerShdw blurRad="38100" dist="19050" dir="2700000" algn="tl" rotWithShape="0">
+                  <a:schemeClr val="dk1">
+                    <a:alpha val="40000"/>
+                  </a:schemeClr>
+                </a:outerShdw>
+              </a:effectLst>
+            </a:endParaRPr>
+          </a:p>
+        </p:txBody>
+      </p:sp>
+      <p:sp>
+        <p:nvSpPr>
+          <p:cNvPr id="78" name="Google Shape;78;p14"/>
+          <p:cNvSpPr txBox="1"/>
+          <p:nvPr/>
+        </p:nvSpPr>
+        <p:spPr>
+          <a:xfrm>
+            <a:off x="556260" y="667385"/>
+            <a:ext cx="8082915" cy="688975"/>
+          </a:xfrm>
+          <a:prstGeom prst="rect">
+            <a:avLst/>
+          </a:prstGeom>
+          <a:noFill/>
+          <a:ln>
+            <a:noFill/>
+          </a:ln>
+        </p:spPr>
+        <p:txBody>
+          <a:bodyPr spcFirstLastPara="1" wrap="square" lIns="91425" tIns="91425" rIns="91425" bIns="91425" anchor="t" anchorCtr="0">
+            <a:spAutoFit/>
+          </a:bodyPr>
+          <a:lstStyle/>
+          <a:p>
+            <a:pPr marL="0" lvl="0" indent="0" algn="l" rtl="0">
+              <a:spcBef>
+                <a:spcPts val="0"/>
+              </a:spcBef>
+              <a:spcAft>
+                <a:spcPts val="0"/>
+              </a:spcAft>
+              <a:buNone/>
+            </a:pPr>
+            <a:r>
+              <a:rPr lang="pt-PT" altLang="pt-BR" sz="3300" b="1">
+                <a:highlight>
+                  <a:srgbClr val="00D563"/>
+                </a:highlight>
+                <a:latin typeface="Poppins"/>
+                <a:ea typeface="Poppins"/>
+                <a:cs typeface="Poppins"/>
+                <a:sym typeface="Poppins"/>
+              </a:rPr>
+              <a:t>Bora para o código!!!</a:t>
+            </a:r>
+            <a:endParaRPr lang="pt-PT" altLang="pt-BR" sz="3300" b="1">
+              <a:highlight>
+                <a:srgbClr val="00D563"/>
+              </a:highlight>
+              <a:latin typeface="Poppins"/>
+              <a:ea typeface="Poppins"/>
+              <a:cs typeface="Poppins"/>
+              <a:sym typeface="Poppins"/>
+            </a:endParaRPr>
+          </a:p>
+        </p:txBody>
+      </p:sp>
+    </p:spTree>
+  </p:cSld>
+  <p:clrMapOvr>
+    <a:masterClrMapping/>
+  </p:clrMapOvr>
+</p:sld>
+</file>
+
+<file path=ppt/slides/slide9.xml><?xml version="1.0" encoding="utf-8"?>
+<p:sld xmlns:a="http://schemas.openxmlformats.org/drawingml/2006/main" xmlns:r="http://schemas.openxmlformats.org/officeDocument/2006/relationships" xmlns:p="http://schemas.openxmlformats.org/presentationml/2006/main">
+  <p:cSld>
+    <p:spTree>
+      <p:nvGrpSpPr>
         <p:cNvPr id="123" name="Shape 123"/>
         <p:cNvGrpSpPr/>
         <p:nvPr/>
@@ -5234,8 +6104,8 @@
         </p:nvSpPr>
         <p:spPr>
           <a:xfrm>
-            <a:off x="526575" y="667650"/>
-            <a:ext cx="5416200" cy="431100"/>
+            <a:off x="533560" y="667650"/>
+            <a:ext cx="5416200" cy="688975"/>
           </a:xfrm>
           <a:prstGeom prst="rect">
             <a:avLst/>
@@ -5261,7 +6131,7 @@
               <a:buNone/>
             </a:pPr>
             <a:r>
-              <a:rPr lang="pt-BR" sz="1600" b="1">
+              <a:rPr lang="pt-BR" sz="3300" b="1">
                 <a:highlight>
                   <a:srgbClr val="00D563"/>
                 </a:highlight>
@@ -5272,7 +6142,7 @@
               </a:rPr>
               <a:t>Docs de apoio</a:t>
             </a:r>
-            <a:endParaRPr sz="1600" b="1">
+            <a:endParaRPr lang="pt-BR" sz="3300" b="1">
               <a:highlight>
                 <a:srgbClr val="00D563"/>
               </a:highlight>
@@ -5292,8 +6162,8 @@
         </p:nvSpPr>
         <p:spPr>
           <a:xfrm>
-            <a:off x="611200" y="1448075"/>
-            <a:ext cx="5416200" cy="504190"/>
+            <a:off x="611505" y="1447800"/>
+            <a:ext cx="7220585" cy="4613275"/>
           </a:xfrm>
           <a:prstGeom prst="rect">
             <a:avLst/>
@@ -5324,15 +6194,204 @@
               <a:buChar char="●"/>
             </a:pPr>
             <a:r>
-              <a:rPr lang="pt-BR">
+              <a:rPr lang="pt-BR" sz="2400">
                 <a:latin typeface="Poppins"/>
                 <a:ea typeface="Poppins"/>
                 <a:cs typeface="Poppins"/>
                 <a:sym typeface="Poppins"/>
               </a:rPr>
-              <a:t>https://www.selenium.dev/documentation/</a:t>
-            </a:r>
-            <a:endParaRPr lang="pt-BR" u="sng">
+              <a:t>https://www.selenium.dev/documentation</a:t>
+            </a:r>
+            <a:endParaRPr lang="pt-BR" sz="2400">
+              <a:latin typeface="Poppins"/>
+              <a:ea typeface="Poppins"/>
+              <a:cs typeface="Poppins"/>
+              <a:sym typeface="Poppins"/>
+            </a:endParaRPr>
+          </a:p>
+          <a:p>
+            <a:pPr marL="457200" lvl="0" indent="-317500" algn="l" rtl="0">
+              <a:lnSpc>
+                <a:spcPct val="150000"/>
+              </a:lnSpc>
+              <a:spcBef>
+                <a:spcPts val="0"/>
+              </a:spcBef>
+              <a:spcAft>
+                <a:spcPts val="0"/>
+              </a:spcAft>
+              <a:buSzPts val="1400"/>
+              <a:buFont typeface="Poppins"/>
+              <a:buChar char="●"/>
+            </a:pPr>
+            <a:r>
+              <a:rPr lang="pt-BR" sz="2400">
+                <a:latin typeface="Poppins"/>
+                <a:ea typeface="Poppins"/>
+                <a:cs typeface="Poppins"/>
+                <a:sym typeface="Poppins"/>
+              </a:rPr>
+              <a:t>https://pypi.org/project/webdriver-manager/</a:t>
+            </a:r>
+            <a:endParaRPr lang="pt-BR" sz="2400">
+              <a:latin typeface="Poppins"/>
+              <a:ea typeface="Poppins"/>
+              <a:cs typeface="Poppins"/>
+              <a:sym typeface="Poppins"/>
+            </a:endParaRPr>
+          </a:p>
+          <a:p>
+            <a:pPr marL="139700" lvl="0" indent="0" algn="l" rtl="0">
+              <a:lnSpc>
+                <a:spcPct val="150000"/>
+              </a:lnSpc>
+              <a:spcBef>
+                <a:spcPts val="0"/>
+              </a:spcBef>
+              <a:spcAft>
+                <a:spcPts val="0"/>
+              </a:spcAft>
+              <a:buSzPts val="1400"/>
+              <a:buNone/>
+            </a:pPr>
+            <a:r>
+              <a:rPr lang="pt-PT" altLang="pt-BR" sz="2400">
+                <a:solidFill>
+                  <a:schemeClr val="hlink"/>
+                </a:solidFill>
+              </a:rPr>
+              <a:t>Grupos:</a:t>
+            </a:r>
+            <a:endParaRPr lang="pt-PT" altLang="pt-BR" sz="2400" u="sng">
+              <a:solidFill>
+                <a:schemeClr val="hlink"/>
+              </a:solidFill>
+            </a:endParaRPr>
+          </a:p>
+          <a:p>
+            <a:pPr marL="457200" lvl="0" indent="-317500" algn="l" rtl="0">
+              <a:lnSpc>
+                <a:spcPct val="150000"/>
+              </a:lnSpc>
+              <a:spcBef>
+                <a:spcPts val="0"/>
+              </a:spcBef>
+              <a:spcAft>
+                <a:spcPts val="0"/>
+              </a:spcAft>
+              <a:buSzPts val="1400"/>
+              <a:buFont typeface="Poppins"/>
+              <a:buChar char="●"/>
+            </a:pPr>
+            <a:r>
+              <a:rPr lang="pt-PT" altLang="pt-BR" sz="2400" u="sng">
+                <a:solidFill>
+                  <a:schemeClr val="hlink"/>
+                </a:solidFill>
+              </a:rPr>
+              <a:t>https://t.me/cursopythonselenium</a:t>
+            </a:r>
+            <a:endParaRPr lang="pt-PT" altLang="pt-BR" sz="2400" u="sng">
+              <a:solidFill>
+                <a:schemeClr val="hlink"/>
+              </a:solidFill>
+            </a:endParaRPr>
+          </a:p>
+          <a:p>
+            <a:pPr marL="457200" lvl="0" indent="-317500" algn="l" rtl="0">
+              <a:lnSpc>
+                <a:spcPct val="150000"/>
+              </a:lnSpc>
+              <a:spcBef>
+                <a:spcPts val="0"/>
+              </a:spcBef>
+              <a:spcAft>
+                <a:spcPts val="0"/>
+              </a:spcAft>
+              <a:buSzPts val="1400"/>
+              <a:buFont typeface="Poppins"/>
+              <a:buChar char="●"/>
+            </a:pPr>
+            <a:r>
+              <a:rPr lang="pt-PT" altLang="pt-BR" sz="2400" u="sng">
+                <a:solidFill>
+                  <a:schemeClr val="hlink"/>
+                </a:solidFill>
+              </a:rPr>
+              <a:t>https://t.me/TestingSelenium</a:t>
+            </a:r>
+            <a:endParaRPr lang="pt-PT" altLang="pt-BR" sz="2400" u="sng">
+              <a:solidFill>
+                <a:schemeClr val="hlink"/>
+              </a:solidFill>
+            </a:endParaRPr>
+          </a:p>
+          <a:p>
+            <a:pPr marL="457200" lvl="0" indent="-317500" algn="l" rtl="0">
+              <a:lnSpc>
+                <a:spcPct val="150000"/>
+              </a:lnSpc>
+              <a:spcBef>
+                <a:spcPts val="0"/>
+              </a:spcBef>
+              <a:spcAft>
+                <a:spcPts val="0"/>
+              </a:spcAft>
+              <a:buSzPts val="1400"/>
+              <a:buFont typeface="Poppins"/>
+              <a:buChar char="●"/>
+            </a:pPr>
+            <a:r>
+              <a:rPr lang="pt-PT" altLang="pt-BR" sz="2400" u="sng">
+                <a:solidFill>
+                  <a:schemeClr val="hlink"/>
+                </a:solidFill>
+              </a:rPr>
+              <a:t>https://www.youtube.com/dunossauro</a:t>
+            </a:r>
+            <a:endParaRPr lang="pt-PT" altLang="pt-BR" sz="2400" u="sng">
+              <a:solidFill>
+                <a:schemeClr val="hlink"/>
+              </a:solidFill>
+            </a:endParaRPr>
+          </a:p>
+          <a:p>
+            <a:pPr marL="457200" lvl="0" indent="-317500" algn="l" rtl="0">
+              <a:lnSpc>
+                <a:spcPct val="150000"/>
+              </a:lnSpc>
+              <a:spcBef>
+                <a:spcPts val="0"/>
+              </a:spcBef>
+              <a:spcAft>
+                <a:spcPts val="0"/>
+              </a:spcAft>
+              <a:buSzPts val="1400"/>
+              <a:buFont typeface="Poppins"/>
+              <a:buChar char="●"/>
+            </a:pPr>
+            <a:endParaRPr lang="pt-PT" altLang="pt-BR" sz="2400" u="sng">
+              <a:solidFill>
+                <a:schemeClr val="hlink"/>
+              </a:solidFill>
+            </a:endParaRPr>
+          </a:p>
+          <a:p>
+            <a:pPr marL="457200" lvl="0" indent="-317500" algn="l" rtl="0">
+              <a:lnSpc>
+                <a:spcPct val="150000"/>
+              </a:lnSpc>
+              <a:spcBef>
+                <a:spcPts val="0"/>
+              </a:spcBef>
+              <a:spcAft>
+                <a:spcPts val="0"/>
+              </a:spcAft>
+              <a:buSzPts val="1400"/>
+              <a:buFont typeface="Poppins"/>
+              <a:buChar char="●"/>
+            </a:pPr>
+            <a:endParaRPr lang="pt-PT" altLang="pt-BR" sz="2400" u="sng">
               <a:solidFill>
                 <a:schemeClr val="hlink"/>
               </a:solidFill>
@@ -5355,7 +6414,7 @@
         </p:blipFill>
         <p:spPr>
           <a:xfrm>
-            <a:off x="6834076" y="2042550"/>
+            <a:off x="7377001" y="2440060"/>
             <a:ext cx="1767299" cy="2703499"/>
           </a:xfrm>
           <a:prstGeom prst="rect">

</xml_diff>

<commit_message>
Realizando a explicação dos comandos
</commit_message>
<xml_diff>
--- a/selenium.pptx
+++ b/selenium.pptx
@@ -6163,7 +6163,7 @@
         <p:spPr>
           <a:xfrm>
             <a:off x="611505" y="1447800"/>
-            <a:ext cx="7220585" cy="4613275"/>
+            <a:ext cx="7220585" cy="5721350"/>
           </a:xfrm>
           <a:prstGeom prst="rect">
             <a:avLst/>
@@ -6232,6 +6232,37 @@
                 <a:sym typeface="Poppins"/>
               </a:rPr>
               <a:t>https://pypi.org/project/webdriver-manager/</a:t>
+            </a:r>
+            <a:endParaRPr lang="pt-BR" sz="2400">
+              <a:latin typeface="Poppins"/>
+              <a:ea typeface="Poppins"/>
+              <a:cs typeface="Poppins"/>
+              <a:sym typeface="Poppins"/>
+            </a:endParaRPr>
+          </a:p>
+          <a:p>
+            <a:pPr marL="457200" lvl="0" indent="-317500" algn="l" rtl="0">
+              <a:lnSpc>
+                <a:spcPct val="150000"/>
+              </a:lnSpc>
+              <a:spcBef>
+                <a:spcPts val="0"/>
+              </a:spcBef>
+              <a:spcAft>
+                <a:spcPts val="0"/>
+              </a:spcAft>
+              <a:buSzPts val="1400"/>
+              <a:buFont typeface="Poppins"/>
+              <a:buChar char="●"/>
+            </a:pPr>
+            <a:r>
+              <a:rPr lang="pt-BR" sz="2400">
+                <a:latin typeface="Poppins"/>
+                <a:ea typeface="Poppins"/>
+                <a:cs typeface="Poppins"/>
+                <a:sym typeface="Poppins"/>
+              </a:rPr>
+              <a:t>https://www.selenium.dev/selenium/docs/api/rb/Selenium/WebDriver/Chrome/Options.html</a:t>
             </a:r>
             <a:endParaRPr lang="pt-BR" sz="2400">
               <a:latin typeface="Poppins"/>

</xml_diff>